<commit_message>
PPTX IETF 124 updated as per John's comments
</commit_message>
<xml_diff>
--- a/idr-nlri-error-handling.pptx
+++ b/idr-nlri-error-handling.pptx
@@ -5,7 +5,7 @@
     <p:sldMasterId id="2147483648" r:id="rId1"/>
   </p:sldMasterIdLst>
   <p:notesMasterIdLst>
-    <p:notesMasterId r:id="rId11"/>
+    <p:notesMasterId r:id="rId12"/>
   </p:notesMasterIdLst>
   <p:sldIdLst>
     <p:sldId id="256" r:id="rId2"/>
@@ -17,6 +17,7 @@
     <p:sldId id="262" r:id="rId8"/>
     <p:sldId id="263" r:id="rId9"/>
     <p:sldId id="264" r:id="rId10"/>
+    <p:sldId id="265" r:id="rId11"/>
   </p:sldIdLst>
   <p:sldSz cx="12192000" cy="6858000"/>
   <p:notesSz cx="6858000" cy="9144000"/>
@@ -125,6 +126,7 @@
 
 <file path=ppt/authors.xml><?xml version="1.0" encoding="utf-8"?>
 <p188:authorLst xmlns:a="http://schemas.openxmlformats.org/drawingml/2006/main" xmlns:r="http://schemas.openxmlformats.org/officeDocument/2006/relationships" xmlns:p188="http://schemas.microsoft.com/office/powerpoint/2018/8/main">
+  <p188:author id="{0216B040-A5ED-71D2-08AA-76410BC5990B}" name="DECRAENE Bruno" initials="BD" userId="DECRAENE Bruno" providerId="None"/>
   <p188:author id="{55403592-3A20-0DB0-032B-19E2BFEAA134}" name="John Scudder" initials="JS" userId="S::jgs@juniper.net::f1189e0a-4232-4620-8495-9c5cc33ae2d8" providerId="AD"/>
 </p188:authorLst>
 </file>
@@ -809,6 +811,20 @@
       <pc:docMk/>
       <pc:sldMk cId="3339695313" sldId="259"/>
     </pc:sldMkLst>
+    <p188:replyLst>
+      <p188:reply id="{7392FE51-DCF2-4537-A4F6-025749D8CBFB}" authorId="{0216B040-A5ED-71D2-08AA-76410BC5990B}" created="2025-10-29T10:34:52.780">
+        <p188:txBody>
+          <a:bodyPr/>
+          <a:lstStyle/>
+          <a:p>
+            <a:r>
+              <a:rPr lang="fr-FR"/>
+              <a:t>Fully agreed. You’re right that this may not be obvious to all readers.</a:t>
+            </a:r>
+          </a:p>
+        </p188:txBody>
+      </p188:reply>
+    </p188:replyLst>
     <p188:txBody>
       <a:bodyPr/>
       <a:lstStyle/>
@@ -820,6 +836,15 @@
         </a:r>
       </a:p>
     </p188:txBody>
+    <p188:extLst>
+      <p:ext xmlns:p="http://schemas.openxmlformats.org/presentationml/2006/main" uri="{57CB4572-C831-44C2-8A1C-0ADB6CCDFE69}">
+        <p223:reactions xmlns:p223="http://schemas.microsoft.com/office/powerpoint/2022/03/main">
+          <p223:rxn type="👍">
+            <p223:instance time="2025-10-29T10:40:56.688" authorId="{0216B040-A5ED-71D2-08AA-76410BC5990B}"/>
+          </p223:rxn>
+        </p223:reactions>
+      </p:ext>
+    </p188:extLst>
   </p188:cm>
 </p188:cmLst>
 </file>
@@ -831,8 +856,8 @@
       <pc:docMk xmlns:pc="http://schemas.microsoft.com/office/powerpoint/2013/main/command"/>
       <pc:sldMk xmlns:pc="http://schemas.microsoft.com/office/powerpoint/2013/main/command" cId="2699201525" sldId="260"/>
       <ac:spMk id="3" creationId="{98AB5BD9-DEBE-86D0-C0DC-B4F83A14D5F3}"/>
-      <ac:txMk cp="251" len="18">
-        <ac:context len="326" hash="868246073"/>
+      <ac:txMk cp="251">
+        <ac:context len="308" hash="1143166942"/>
       </ac:txMk>
     </ac:txMkLst>
     <p188:pos x="8332694" y="2598457"/>
@@ -846,6 +871,15 @@
         </a:r>
       </a:p>
     </p188:txBody>
+    <p188:extLst>
+      <p:ext xmlns:p="http://schemas.openxmlformats.org/presentationml/2006/main" uri="{57CB4572-C831-44C2-8A1C-0ADB6CCDFE69}">
+        <p223:reactions xmlns:p223="http://schemas.microsoft.com/office/powerpoint/2022/03/main">
+          <p223:rxn type="👍">
+            <p223:instance time="2025-10-29T10:42:30.362" authorId="{0216B040-A5ED-71D2-08AA-76410BC5990B}"/>
+          </p223:rxn>
+        </p223:reactions>
+      </p:ext>
+    </p188:extLst>
   </p188:cm>
 </p188:cmLst>
 </file>
@@ -858,7 +892,7 @@
       <pc:sldMk xmlns:pc="http://schemas.microsoft.com/office/powerpoint/2013/main/command" cId="1148738709" sldId="261"/>
       <ac:spMk id="3" creationId="{647A37BA-2D5A-8FBB-E3C4-7E0715955D11}"/>
       <ac:txMk cp="194" len="64">
-        <ac:context len="337" hash="1955730855"/>
+        <ac:context len="380" hash="2941234641"/>
       </ac:txMk>
     </ac:txMkLst>
     <p188:pos x="9058835" y="1979893"/>
@@ -958,7 +992,7 @@
           <a:p>
             <a:fld id="{6B3A3F2F-16EF-5743-9823-704C3351FBC7}" type="datetimeFigureOut">
               <a:rPr lang="en-US" smtClean="0"/>
-              <a:t>10/23/25</a:t>
+              <a:t>10/29/2025</a:t>
             </a:fld>
             <a:endParaRPr lang="en-US"/>
           </a:p>
@@ -1116,7 +1150,7 @@
           <a:p>
             <a:fld id="{0FB28B67-6587-8446-925A-F89115EBD76E}" type="slidenum">
               <a:rPr lang="en-US" smtClean="0"/>
-              <a:t>‹#›</a:t>
+              <a:t>‹N°›</a:t>
             </a:fld>
             <a:endParaRPr lang="en-US"/>
           </a:p>
@@ -1456,7 +1490,7 @@
           <a:p>
             <a:fld id="{1942F851-F8A8-476F-9E6F-F7AE7574E7D7}" type="datetimeFigureOut">
               <a:rPr lang="fr-FR" smtClean="0"/>
-              <a:t>23/10/2025</a:t>
+              <a:t>29/10/2025</a:t>
             </a:fld>
             <a:endParaRPr lang="fr-FR"/>
           </a:p>
@@ -1510,7 +1544,7 @@
           <a:p>
             <a:fld id="{6EB0AFAF-01AD-403D-8986-94521B07DECF}" type="slidenum">
               <a:rPr lang="fr-FR" smtClean="0"/>
-              <a:t>‹#›</a:t>
+              <a:t>‹N°›</a:t>
             </a:fld>
             <a:endParaRPr lang="fr-FR"/>
           </a:p>
@@ -1654,7 +1688,7 @@
           <a:p>
             <a:fld id="{1942F851-F8A8-476F-9E6F-F7AE7574E7D7}" type="datetimeFigureOut">
               <a:rPr lang="fr-FR" smtClean="0"/>
-              <a:t>23/10/2025</a:t>
+              <a:t>29/10/2025</a:t>
             </a:fld>
             <a:endParaRPr lang="fr-FR"/>
           </a:p>
@@ -1708,7 +1742,7 @@
           <a:p>
             <a:fld id="{6EB0AFAF-01AD-403D-8986-94521B07DECF}" type="slidenum">
               <a:rPr lang="fr-FR" smtClean="0"/>
-              <a:t>‹#›</a:t>
+              <a:t>‹N°›</a:t>
             </a:fld>
             <a:endParaRPr lang="fr-FR"/>
           </a:p>
@@ -1862,7 +1896,7 @@
           <a:p>
             <a:fld id="{1942F851-F8A8-476F-9E6F-F7AE7574E7D7}" type="datetimeFigureOut">
               <a:rPr lang="fr-FR" smtClean="0"/>
-              <a:t>23/10/2025</a:t>
+              <a:t>29/10/2025</a:t>
             </a:fld>
             <a:endParaRPr lang="fr-FR"/>
           </a:p>
@@ -1916,7 +1950,7 @@
           <a:p>
             <a:fld id="{6EB0AFAF-01AD-403D-8986-94521B07DECF}" type="slidenum">
               <a:rPr lang="fr-FR" smtClean="0"/>
-              <a:t>‹#›</a:t>
+              <a:t>‹N°›</a:t>
             </a:fld>
             <a:endParaRPr lang="fr-FR"/>
           </a:p>
@@ -2060,7 +2094,7 @@
           <a:p>
             <a:fld id="{1942F851-F8A8-476F-9E6F-F7AE7574E7D7}" type="datetimeFigureOut">
               <a:rPr lang="fr-FR" smtClean="0"/>
-              <a:t>23/10/2025</a:t>
+              <a:t>29/10/2025</a:t>
             </a:fld>
             <a:endParaRPr lang="fr-FR"/>
           </a:p>
@@ -2114,7 +2148,7 @@
           <a:p>
             <a:fld id="{6EB0AFAF-01AD-403D-8986-94521B07DECF}" type="slidenum">
               <a:rPr lang="fr-FR" smtClean="0"/>
-              <a:t>‹#›</a:t>
+              <a:t>‹N°›</a:t>
             </a:fld>
             <a:endParaRPr lang="fr-FR"/>
           </a:p>
@@ -2335,7 +2369,7 @@
           <a:p>
             <a:fld id="{1942F851-F8A8-476F-9E6F-F7AE7574E7D7}" type="datetimeFigureOut">
               <a:rPr lang="fr-FR" smtClean="0"/>
-              <a:t>23/10/2025</a:t>
+              <a:t>29/10/2025</a:t>
             </a:fld>
             <a:endParaRPr lang="fr-FR"/>
           </a:p>
@@ -2389,7 +2423,7 @@
           <a:p>
             <a:fld id="{6EB0AFAF-01AD-403D-8986-94521B07DECF}" type="slidenum">
               <a:rPr lang="fr-FR" smtClean="0"/>
-              <a:t>‹#›</a:t>
+              <a:t>‹N°›</a:t>
             </a:fld>
             <a:endParaRPr lang="fr-FR"/>
           </a:p>
@@ -2600,7 +2634,7 @@
           <a:p>
             <a:fld id="{1942F851-F8A8-476F-9E6F-F7AE7574E7D7}" type="datetimeFigureOut">
               <a:rPr lang="fr-FR" smtClean="0"/>
-              <a:t>23/10/2025</a:t>
+              <a:t>29/10/2025</a:t>
             </a:fld>
             <a:endParaRPr lang="fr-FR"/>
           </a:p>
@@ -2654,7 +2688,7 @@
           <a:p>
             <a:fld id="{6EB0AFAF-01AD-403D-8986-94521B07DECF}" type="slidenum">
               <a:rPr lang="fr-FR" smtClean="0"/>
-              <a:t>‹#›</a:t>
+              <a:t>‹N°›</a:t>
             </a:fld>
             <a:endParaRPr lang="fr-FR"/>
           </a:p>
@@ -3012,7 +3046,7 @@
           <a:p>
             <a:fld id="{1942F851-F8A8-476F-9E6F-F7AE7574E7D7}" type="datetimeFigureOut">
               <a:rPr lang="fr-FR" smtClean="0"/>
-              <a:t>23/10/2025</a:t>
+              <a:t>29/10/2025</a:t>
             </a:fld>
             <a:endParaRPr lang="fr-FR"/>
           </a:p>
@@ -3066,7 +3100,7 @@
           <a:p>
             <a:fld id="{6EB0AFAF-01AD-403D-8986-94521B07DECF}" type="slidenum">
               <a:rPr lang="fr-FR" smtClean="0"/>
-              <a:t>‹#›</a:t>
+              <a:t>‹N°›</a:t>
             </a:fld>
             <a:endParaRPr lang="fr-FR"/>
           </a:p>
@@ -3153,7 +3187,7 @@
           <a:p>
             <a:fld id="{1942F851-F8A8-476F-9E6F-F7AE7574E7D7}" type="datetimeFigureOut">
               <a:rPr lang="fr-FR" smtClean="0"/>
-              <a:t>23/10/2025</a:t>
+              <a:t>29/10/2025</a:t>
             </a:fld>
             <a:endParaRPr lang="fr-FR"/>
           </a:p>
@@ -3207,7 +3241,7 @@
           <a:p>
             <a:fld id="{6EB0AFAF-01AD-403D-8986-94521B07DECF}" type="slidenum">
               <a:rPr lang="fr-FR" smtClean="0"/>
-              <a:t>‹#›</a:t>
+              <a:t>‹N°›</a:t>
             </a:fld>
             <a:endParaRPr lang="fr-FR"/>
           </a:p>
@@ -3266,7 +3300,7 @@
           <a:p>
             <a:fld id="{1942F851-F8A8-476F-9E6F-F7AE7574E7D7}" type="datetimeFigureOut">
               <a:rPr lang="fr-FR" smtClean="0"/>
-              <a:t>23/10/2025</a:t>
+              <a:t>29/10/2025</a:t>
             </a:fld>
             <a:endParaRPr lang="fr-FR"/>
           </a:p>
@@ -3320,7 +3354,7 @@
           <a:p>
             <a:fld id="{6EB0AFAF-01AD-403D-8986-94521B07DECF}" type="slidenum">
               <a:rPr lang="fr-FR" smtClean="0"/>
-              <a:t>‹#›</a:t>
+              <a:t>‹N°›</a:t>
             </a:fld>
             <a:endParaRPr lang="fr-FR"/>
           </a:p>
@@ -3577,7 +3611,7 @@
           <a:p>
             <a:fld id="{1942F851-F8A8-476F-9E6F-F7AE7574E7D7}" type="datetimeFigureOut">
               <a:rPr lang="fr-FR" smtClean="0"/>
-              <a:t>23/10/2025</a:t>
+              <a:t>29/10/2025</a:t>
             </a:fld>
             <a:endParaRPr lang="fr-FR"/>
           </a:p>
@@ -3631,7 +3665,7 @@
           <a:p>
             <a:fld id="{6EB0AFAF-01AD-403D-8986-94521B07DECF}" type="slidenum">
               <a:rPr lang="fr-FR" smtClean="0"/>
-              <a:t>‹#›</a:t>
+              <a:t>‹N°›</a:t>
             </a:fld>
             <a:endParaRPr lang="fr-FR"/>
           </a:p>
@@ -3865,7 +3899,7 @@
           <a:p>
             <a:fld id="{1942F851-F8A8-476F-9E6F-F7AE7574E7D7}" type="datetimeFigureOut">
               <a:rPr lang="fr-FR" smtClean="0"/>
-              <a:t>23/10/2025</a:t>
+              <a:t>29/10/2025</a:t>
             </a:fld>
             <a:endParaRPr lang="fr-FR"/>
           </a:p>
@@ -3919,7 +3953,7 @@
           <a:p>
             <a:fld id="{6EB0AFAF-01AD-403D-8986-94521B07DECF}" type="slidenum">
               <a:rPr lang="fr-FR" smtClean="0"/>
-              <a:t>‹#›</a:t>
+              <a:t>‹N°›</a:t>
             </a:fld>
             <a:endParaRPr lang="fr-FR"/>
           </a:p>
@@ -4159,7 +4193,7 @@
           <a:p>
             <a:fld id="{1942F851-F8A8-476F-9E6F-F7AE7574E7D7}" type="datetimeFigureOut">
               <a:rPr lang="fr-FR" smtClean="0"/>
-              <a:t>23/10/2025</a:t>
+              <a:t>29/10/2025</a:t>
             </a:fld>
             <a:endParaRPr lang="fr-FR"/>
           </a:p>
@@ -4249,57 +4283,9 @@
           <a:p>
             <a:fld id="{6EB0AFAF-01AD-403D-8986-94521B07DECF}" type="slidenum">
               <a:rPr lang="fr-FR" smtClean="0"/>
-              <a:t>‹#›</a:t>
+              <a:t>‹N°›</a:t>
             </a:fld>
             <a:endParaRPr lang="fr-FR"/>
-          </a:p>
-        </p:txBody>
-      </p:sp>
-      <p:sp>
-        <p:nvSpPr>
-          <p:cNvPr id="8" name="TextBox 7">
-            <a:extLst>
-              <a:ext uri="{FF2B5EF4-FFF2-40B4-BE49-F238E27FC236}">
-                <a16:creationId xmlns:a16="http://schemas.microsoft.com/office/drawing/2014/main" id="{6E4E82A0-833A-E111-FE9F-37FB5DD510F9}"/>
-              </a:ext>
-            </a:extLst>
-          </p:cNvPr>
-          <p:cNvSpPr txBox="1"/>
-          <p:nvPr userDrawn="1">
-            <p:extLst>
-              <p:ext uri="{1162E1C5-73C7-4A58-AE30-91384D911F3F}">
-                <p184:classification xmlns:p184="http://schemas.microsoft.com/office/powerpoint/2018/4/main" val="ftr"/>
-              </p:ext>
-            </p:extLst>
-          </p:nvPr>
-        </p:nvSpPr>
-        <p:spPr>
-          <a:xfrm>
-            <a:off x="5592763" y="6687820"/>
-            <a:ext cx="1023937" cy="106680"/>
-          </a:xfrm>
-          <a:prstGeom prst="rect">
-            <a:avLst/>
-          </a:prstGeom>
-        </p:spPr>
-        <p:txBody>
-          <a:bodyPr horzOverflow="overflow" lIns="0" tIns="0" rIns="0" bIns="0">
-            <a:spAutoFit/>
-          </a:bodyPr>
-          <a:lstStyle/>
-          <a:p>
-            <a:pPr algn="l"/>
-            <a:r>
-              <a:rPr lang="en-US" sz="700">
-                <a:solidFill>
-                  <a:srgbClr val="000000">
-                    <a:alpha val="50000"/>
-                  </a:srgbClr>
-                </a:solidFill>
-                <a:latin typeface="Aptos" panose="020B0004020202020204" pitchFamily="34" charset="0"/>
-              </a:rPr>
-              <a:t>Juniper Business Use Only</a:t>
-            </a:r>
           </a:p>
         </p:txBody>
       </p:sp>
@@ -4667,7 +4653,7 @@
             </a:br>
             <a:r>
               <a:rPr lang="fr-FR" sz="2400" dirty="0"/>
-              <a:t>draft-decraene-idr-nlri-error-handling-00</a:t>
+              <a:t>draft-decraene-idr-nlri-error-handling-01</a:t>
             </a:r>
             <a:endParaRPr lang="fr-FR" dirty="0"/>
           </a:p>
@@ -4728,6 +4714,120 @@
     <p:extLst>
       <p:ext uri="{BB962C8B-B14F-4D97-AF65-F5344CB8AC3E}">
         <p14:creationId xmlns:p14="http://schemas.microsoft.com/office/powerpoint/2010/main" val="1087970239"/>
+      </p:ext>
+    </p:extLst>
+  </p:cSld>
+  <p:clrMapOvr>
+    <a:masterClrMapping/>
+  </p:clrMapOvr>
+</p:sld>
+</file>
+
+<file path=ppt/slides/slide10.xml><?xml version="1.0" encoding="utf-8"?>
+<p:sld xmlns:a="http://schemas.openxmlformats.org/drawingml/2006/main" xmlns:r="http://schemas.openxmlformats.org/officeDocument/2006/relationships" xmlns:p="http://schemas.openxmlformats.org/presentationml/2006/main">
+  <p:cSld>
+    <p:spTree>
+      <p:nvGrpSpPr>
+        <p:cNvPr id="1" name=""/>
+        <p:cNvGrpSpPr/>
+        <p:nvPr/>
+      </p:nvGrpSpPr>
+      <p:grpSpPr>
+        <a:xfrm>
+          <a:off x="0" y="0"/>
+          <a:ext cx="0" cy="0"/>
+          <a:chOff x="0" y="0"/>
+          <a:chExt cx="0" cy="0"/>
+        </a:xfrm>
+      </p:grpSpPr>
+      <p:sp>
+        <p:nvSpPr>
+          <p:cNvPr id="2" name="Titre 1">
+            <a:extLst>
+              <a:ext uri="{FF2B5EF4-FFF2-40B4-BE49-F238E27FC236}">
+                <a16:creationId xmlns:a16="http://schemas.microsoft.com/office/drawing/2014/main" id="{25C8B20A-4073-56CA-9E05-B8E6D7C838AA}"/>
+              </a:ext>
+            </a:extLst>
+          </p:cNvPr>
+          <p:cNvSpPr>
+            <a:spLocks noGrp="1"/>
+          </p:cNvSpPr>
+          <p:nvPr>
+            <p:ph type="title"/>
+          </p:nvPr>
+        </p:nvSpPr>
+        <p:spPr/>
+        <p:txBody>
+          <a:bodyPr/>
+          <a:lstStyle/>
+          <a:p>
+            <a:r>
+              <a:rPr lang="en-US" dirty="0"/>
+              <a:t>Next steps</a:t>
+            </a:r>
+          </a:p>
+        </p:txBody>
+      </p:sp>
+      <p:sp>
+        <p:nvSpPr>
+          <p:cNvPr id="3" name="Espace réservé du contenu 2">
+            <a:extLst>
+              <a:ext uri="{FF2B5EF4-FFF2-40B4-BE49-F238E27FC236}">
+                <a16:creationId xmlns:a16="http://schemas.microsoft.com/office/drawing/2014/main" id="{C2407E1F-D90C-A9CD-B7F9-C2DD43FDE842}"/>
+              </a:ext>
+            </a:extLst>
+          </p:cNvPr>
+          <p:cNvSpPr>
+            <a:spLocks noGrp="1"/>
+          </p:cNvSpPr>
+          <p:nvPr>
+            <p:ph idx="1"/>
+          </p:nvPr>
+        </p:nvSpPr>
+        <p:spPr/>
+        <p:txBody>
+          <a:bodyPr/>
+          <a:lstStyle/>
+          <a:p>
+            <a:r>
+              <a:rPr lang="en-US" dirty="0"/>
+              <a:t>WG review and comments are welcomed</a:t>
+            </a:r>
+          </a:p>
+          <a:p>
+            <a:pPr lvl="1"/>
+            <a:r>
+              <a:rPr lang="en-US" dirty="0"/>
+              <a:t>Thanks for reviews and comments on -00</a:t>
+            </a:r>
+          </a:p>
+          <a:p>
+            <a:pPr lvl="1"/>
+            <a:r>
+              <a:rPr lang="en-US" dirty="0"/>
+              <a:t>-</a:t>
+            </a:r>
+            <a:r>
+              <a:rPr lang="en-US"/>
+              <a:t>01 published</a:t>
+            </a:r>
+            <a:endParaRPr lang="en-US" dirty="0"/>
+          </a:p>
+          <a:p>
+            <a:endParaRPr lang="en-US" dirty="0"/>
+          </a:p>
+          <a:p>
+            <a:r>
+              <a:rPr lang="en-US" dirty="0"/>
+              <a:t>Asking for WG adoption call</a:t>
+            </a:r>
+          </a:p>
+        </p:txBody>
+      </p:sp>
+    </p:spTree>
+    <p:extLst>
+      <p:ext uri="{BB962C8B-B14F-4D97-AF65-F5344CB8AC3E}">
+        <p14:creationId xmlns:p14="http://schemas.microsoft.com/office/powerpoint/2010/main" val="2802938541"/>
       </p:ext>
     </p:extLst>
   </p:cSld>
@@ -5209,7 +5309,7 @@
         <p:spPr/>
         <p:txBody>
           <a:bodyPr>
-            <a:normAutofit/>
+            <a:normAutofit fontScale="62500" lnSpcReduction="20000"/>
           </a:bodyPr>
           <a:lstStyle/>
           <a:p>
@@ -5248,19 +5348,76 @@
               </a:rPr>
               <a:t> BGP session reset (high network impact, not likely recoverable)</a:t>
             </a:r>
-            <a:endParaRPr lang="en-US" dirty="0"/>
-          </a:p>
-          <a:p>
-            <a:endParaRPr lang="en-US" dirty="0"/>
           </a:p>
           <a:p>
             <a:pPr marL="0" indent="0">
               <a:buNone/>
             </a:pPr>
+            <a:endParaRPr lang="en-US" dirty="0">
+              <a:sym typeface="Wingdings" panose="05000000000000000000" pitchFamily="2" charset="2"/>
+            </a:endParaRPr>
+          </a:p>
+          <a:p>
+            <a:pPr marL="0" indent="0">
+              <a:buNone/>
+            </a:pPr>
             <a:r>
               <a:rPr lang="en-US" dirty="0"/>
-              <a:t>	</a:t>
-            </a:r>
+              <a:t>BGP session restart is not likely to help</a:t>
+            </a:r>
+          </a:p>
+          <a:p>
+            <a:r>
+              <a:rPr lang="en-US" dirty="0"/>
+              <a:t>Same routes, same NRLIs advertised</a:t>
+            </a:r>
+          </a:p>
+          <a:p>
+            <a:r>
+              <a:rPr lang="en-US" dirty="0">
+                <a:sym typeface="Wingdings" panose="05000000000000000000" pitchFamily="2" charset="2"/>
+              </a:rPr>
+              <a:t> same error</a:t>
+            </a:r>
+          </a:p>
+          <a:p>
+            <a:r>
+              <a:rPr lang="en-US" dirty="0">
+                <a:sym typeface="Wingdings" panose="05000000000000000000" pitchFamily="2" charset="2"/>
+              </a:rPr>
+              <a:t> BGP session reset again (and again and again)</a:t>
+            </a:r>
+          </a:p>
+          <a:p>
+            <a:endParaRPr lang="en-US" dirty="0"/>
+          </a:p>
+          <a:p>
+            <a:pPr>
+              <a:buFont typeface="Wingdings" panose="05000000000000000000" pitchFamily="2" charset="2"/>
+              <a:buChar char="à"/>
+            </a:pPr>
+            <a:r>
+              <a:rPr lang="en-US" dirty="0"/>
+              <a:t> High network impact, urgent human intervention required</a:t>
+            </a:r>
+          </a:p>
+          <a:p>
+            <a:r>
+              <a:rPr lang="en-US" dirty="0"/>
+              <a:t>Likely urgent software fix, validation, deployment</a:t>
+            </a:r>
+          </a:p>
+          <a:p>
+            <a:pPr marL="0" indent="0">
+              <a:buNone/>
+            </a:pPr>
+            <a:endParaRPr lang="en-US" dirty="0"/>
+          </a:p>
+          <a:p>
+            <a:endParaRPr lang="en-US" dirty="0"/>
+          </a:p>
+          <a:p>
+            <a:endParaRPr lang="en-US" dirty="0"/>
           </a:p>
         </p:txBody>
       </p:sp>
@@ -5387,7 +5544,7 @@
             <a:pPr lvl="1"/>
             <a:r>
               <a:rPr lang="en-US" dirty="0"/>
-              <a:t>Perform “Treat-As-Withdraw”, using the “withdraw” in the NLRI_KEY_LIST attribute</a:t>
+              <a:t>Perform “Treat-As-Withdraw”, using the NLRI_KEY_LIST attribute</a:t>
             </a:r>
           </a:p>
           <a:p>
@@ -5522,6 +5679,13 @@
             <a:r>
               <a:rPr lang="en-US" dirty="0"/>
               <a:t>(-) Extra complexity on the sender (encodes twice the NLRI list)</a:t>
+            </a:r>
+          </a:p>
+          <a:p>
+            <a:pPr lvl="2"/>
+            <a:r>
+              <a:rPr lang="en-US" dirty="0"/>
+              <a:t>Implementation, BGP UPDATE space, CPU time</a:t>
             </a:r>
           </a:p>
           <a:p>

</xml_diff>